<commit_message>
new example for @Repository
</commit_message>
<xml_diff>
--- a/doc/intro/slides/lesson_08_spring.pptx
+++ b/doc/intro/slides/lesson_08_spring.pptx
@@ -211,7 +211,7 @@
           <a:p>
             <a:fld id="{9B5B52BA-3295-0343-9E28-A260A811DD10}" type="datetimeFigureOut">
               <a:rPr lang="en-US" smtClean="0"/>
-              <a:t>12/26/18</a:t>
+              <a:t>25-Feb-19</a:t>
             </a:fld>
             <a:endParaRPr lang="en-US"/>
           </a:p>
@@ -610,7 +610,7 @@
           <a:p>
             <a:fld id="{04F1D4A2-813C-F741-B481-C92B3A596030}" type="datetimeFigureOut">
               <a:rPr lang="en-US" smtClean="0"/>
-              <a:t>12/26/18</a:t>
+              <a:t>25-Feb-19</a:t>
             </a:fld>
             <a:endParaRPr lang="en-US"/>
           </a:p>
@@ -780,7 +780,7 @@
           <a:p>
             <a:fld id="{04F1D4A2-813C-F741-B481-C92B3A596030}" type="datetimeFigureOut">
               <a:rPr lang="en-US" smtClean="0"/>
-              <a:t>12/26/18</a:t>
+              <a:t>25-Feb-19</a:t>
             </a:fld>
             <a:endParaRPr lang="en-US"/>
           </a:p>
@@ -960,7 +960,7 @@
           <a:p>
             <a:fld id="{04F1D4A2-813C-F741-B481-C92B3A596030}" type="datetimeFigureOut">
               <a:rPr lang="en-US" smtClean="0"/>
-              <a:t>12/26/18</a:t>
+              <a:t>25-Feb-19</a:t>
             </a:fld>
             <a:endParaRPr lang="en-US"/>
           </a:p>
@@ -1141,7 +1141,7 @@
           <a:p>
             <a:fld id="{04F1D4A2-813C-F741-B481-C92B3A596030}" type="datetimeFigureOut">
               <a:rPr lang="en-US" smtClean="0"/>
-              <a:t>12/26/18</a:t>
+              <a:t>25-Feb-19</a:t>
             </a:fld>
             <a:endParaRPr lang="en-US"/>
           </a:p>
@@ -1387,7 +1387,7 @@
           <a:p>
             <a:fld id="{04F1D4A2-813C-F741-B481-C92B3A596030}" type="datetimeFigureOut">
               <a:rPr lang="en-US" smtClean="0"/>
-              <a:t>12/26/18</a:t>
+              <a:t>25-Feb-19</a:t>
             </a:fld>
             <a:endParaRPr lang="en-US"/>
           </a:p>
@@ -1619,7 +1619,7 @@
           <a:p>
             <a:fld id="{04F1D4A2-813C-F741-B481-C92B3A596030}" type="datetimeFigureOut">
               <a:rPr lang="en-US" smtClean="0"/>
-              <a:t>12/26/18</a:t>
+              <a:t>25-Feb-19</a:t>
             </a:fld>
             <a:endParaRPr lang="en-US"/>
           </a:p>
@@ -1986,7 +1986,7 @@
           <a:p>
             <a:fld id="{04F1D4A2-813C-F741-B481-C92B3A596030}" type="datetimeFigureOut">
               <a:rPr lang="en-US" smtClean="0"/>
-              <a:t>12/26/18</a:t>
+              <a:t>25-Feb-19</a:t>
             </a:fld>
             <a:endParaRPr lang="en-US"/>
           </a:p>
@@ -2104,7 +2104,7 @@
           <a:p>
             <a:fld id="{04F1D4A2-813C-F741-B481-C92B3A596030}" type="datetimeFigureOut">
               <a:rPr lang="en-US" smtClean="0"/>
-              <a:t>12/26/18</a:t>
+              <a:t>25-Feb-19</a:t>
             </a:fld>
             <a:endParaRPr lang="en-US"/>
           </a:p>
@@ -2199,7 +2199,7 @@
           <a:p>
             <a:fld id="{04F1D4A2-813C-F741-B481-C92B3A596030}" type="datetimeFigureOut">
               <a:rPr lang="en-US" smtClean="0"/>
-              <a:t>12/26/18</a:t>
+              <a:t>25-Feb-19</a:t>
             </a:fld>
             <a:endParaRPr lang="en-US"/>
           </a:p>
@@ -2476,7 +2476,7 @@
           <a:p>
             <a:fld id="{04F1D4A2-813C-F741-B481-C92B3A596030}" type="datetimeFigureOut">
               <a:rPr lang="en-US" smtClean="0"/>
-              <a:t>12/26/18</a:t>
+              <a:t>25-Feb-19</a:t>
             </a:fld>
             <a:endParaRPr lang="en-US"/>
           </a:p>
@@ -2729,7 +2729,7 @@
           <a:p>
             <a:fld id="{04F1D4A2-813C-F741-B481-C92B3A596030}" type="datetimeFigureOut">
               <a:rPr lang="en-US" smtClean="0"/>
-              <a:t>12/26/18</a:t>
+              <a:t>25-Feb-19</a:t>
             </a:fld>
             <a:endParaRPr lang="en-US"/>
           </a:p>
@@ -2942,7 +2942,7 @@
           <a:p>
             <a:fld id="{04F1D4A2-813C-F741-B481-C92B3A596030}" type="datetimeFigureOut">
               <a:rPr lang="en-US" smtClean="0"/>
-              <a:t>12/26/18</a:t>
+              <a:t>25-Feb-19</a:t>
             </a:fld>
             <a:endParaRPr lang="en-US"/>
           </a:p>
@@ -3425,11 +3425,7 @@
             <a:pPr algn="r"/>
             <a:r>
               <a:rPr lang="en-US" smtClean="0"/>
-              <a:t>Prof</a:t>
-            </a:r>
-            <a:r>
-              <a:rPr lang="en-US" smtClean="0"/>
-              <a:t>. </a:t>
+              <a:t>Prof. </a:t>
             </a:r>
             <a:r>
               <a:rPr lang="en-US" dirty="0" smtClean="0"/>
@@ -4114,7 +4110,7 @@
           <a:lstStyle/>
           <a:p>
             <a:r>
-              <a:rPr lang="en-US" dirty="0" err="1" smtClean="0"/>
+              <a:rPr lang="en-US" i="1" dirty="0" err="1" smtClean="0"/>
               <a:t>SpringBoot</a:t>
             </a:r>
             <a:r>
@@ -4976,7 +4972,15 @@
           <a:p>
             <a:r>
               <a:rPr lang="en-US" dirty="0" smtClean="0"/>
-              <a:t>Spring is the most popular framework to develop backend enterprise applications</a:t>
+              <a:t>Spring is </a:t>
+            </a:r>
+            <a:r>
+              <a:rPr lang="en-US" dirty="0" smtClean="0"/>
+              <a:t>arguably the </a:t>
+            </a:r>
+            <a:r>
+              <a:rPr lang="en-US" dirty="0" smtClean="0"/>
+              <a:t>most popular framework to develop backend enterprise applications</a:t>
             </a:r>
           </a:p>
           <a:p>
@@ -5109,7 +5113,15 @@
           <a:p>
             <a:r>
               <a:rPr lang="en-US" dirty="0" smtClean="0"/>
-              <a:t>That because Spring still implements the “Servlet” API of JEE (which is the one used to interact with HTTP requests)</a:t>
+              <a:t>That because Spring still implements the “</a:t>
+            </a:r>
+            <a:r>
+              <a:rPr lang="en-US" i="1" dirty="0" smtClean="0"/>
+              <a:t>Servlet</a:t>
+            </a:r>
+            <a:r>
+              <a:rPr lang="en-US" dirty="0" smtClean="0"/>
+              <a:t>” API of JEE (which is the one used to interact with HTTP requests)</a:t>
             </a:r>
           </a:p>
           <a:p>
@@ -5137,7 +5149,15 @@
             <a:pPr lvl="1"/>
             <a:r>
               <a:rPr lang="en-US" dirty="0" smtClean="0"/>
-              <a:t>These two are servers that support the “Servlet” API, but not the other specs of JEE</a:t>
+              <a:t>These two are servers that support the “</a:t>
+            </a:r>
+            <a:r>
+              <a:rPr lang="en-US" i="1" dirty="0" smtClean="0"/>
+              <a:t>Servlet</a:t>
+            </a:r>
+            <a:r>
+              <a:rPr lang="en-US" dirty="0" smtClean="0"/>
+              <a:t>” API, but not the other specs of JEE</a:t>
             </a:r>
             <a:endParaRPr lang="en-US" dirty="0"/>
           </a:p>
@@ -5231,7 +5251,11 @@
           <a:p>
             <a:r>
               <a:rPr lang="en-US" dirty="0" smtClean="0"/>
-              <a:t> Spring is huge, so we will just discuss what we have seen so far in JEE, </a:t>
+              <a:t>Spring </a:t>
+            </a:r>
+            <a:r>
+              <a:rPr lang="en-US" dirty="0" smtClean="0"/>
+              <a:t>is huge, so we will just discuss what we have seen so far in JEE, </a:t>
             </a:r>
             <a:r>
               <a:rPr lang="en-US" dirty="0" err="1" smtClean="0"/>

</xml_diff>

<commit_message>
update for handling of "/"
</commit_message>
<xml_diff>
--- a/doc/intro/slides/lesson_08_spring.pptx
+++ b/doc/intro/slides/lesson_08_spring.pptx
@@ -4314,7 +4314,7 @@
         </p:spPr>
         <p:txBody>
           <a:bodyPr>
-            <a:normAutofit/>
+            <a:normAutofit fontScale="92500" lnSpcReduction="20000"/>
           </a:bodyPr>
           <a:lstStyle/>
           <a:p>
@@ -4343,6 +4343,13 @@
           <a:p>
             <a:r>
               <a:rPr lang="en-US" b="1" dirty="0" smtClean="0"/>
+              <a:t>intro/spring/bean/repository</a:t>
+            </a:r>
+            <a:endParaRPr lang="en-US" b="1" dirty="0" smtClean="0"/>
+          </a:p>
+          <a:p>
+            <a:r>
+              <a:rPr lang="en-US" b="1" dirty="0" smtClean="0"/>
               <a:t>intro/spring/bean/profile</a:t>
             </a:r>
             <a:endParaRPr lang="en-US" b="1" dirty="0"/>
@@ -4352,6 +4359,16 @@
               <a:rPr lang="en-US" b="1" dirty="0" smtClean="0"/>
               <a:t>intro/spring/bean/configuration</a:t>
             </a:r>
+          </a:p>
+          <a:p>
+            <a:r>
+              <a:rPr lang="en-US" b="1" dirty="0" smtClean="0"/>
+              <a:t>intro/spring/bean/</a:t>
+            </a:r>
+            <a:r>
+              <a:rPr lang="en-US" b="1" dirty="0" err="1" smtClean="0"/>
+              <a:t>async</a:t>
+            </a:r>
             <a:endParaRPr lang="en-US" b="1" dirty="0"/>
           </a:p>
           <a:p>
@@ -4368,7 +4385,11 @@
           <a:p>
             <a:r>
               <a:rPr lang="en-US" dirty="0" smtClean="0"/>
-              <a:t>Exercises for Lesson 08 (see documentation)</a:t>
+              <a:t>Exercises </a:t>
+            </a:r>
+            <a:r>
+              <a:rPr lang="en-US" dirty="0" smtClean="0"/>
+              <a:t>for Lesson 08 (see documentation)</a:t>
             </a:r>
             <a:endParaRPr lang="en-US" dirty="0"/>
           </a:p>

</xml_diff>